<commit_message>
Update Week 3 lecture 1 - LTA.pptx
</commit_message>
<xml_diff>
--- a/PP WORK/Instructor Version/Week 3/Week 3 lecture 1 - LTA.pptx
+++ b/PP WORK/Instructor Version/Week 3/Week 3 lecture 1 - LTA.pptx
@@ -123,7 +123,7 @@
   </p:defaultTextStyle>
   <p:extLst>
     <p:ext uri="{EFAFB233-063F-42B5-8137-9DF3F51BA10A}">
-      <p15:sldGuideLst xmlns:p15="http://schemas.microsoft.com/office/powerpoint/2012/main"/>
+      <p15:sldGuideLst xmlns:p15="http://schemas.microsoft.com/office/powerpoint/2012/main" xmlns=""/>
     </p:ext>
   </p:extLst>
 </p:presentation>
@@ -211,7 +211,7 @@
           <a:p>
             <a:fld id="{18AB4343-410D-4114-8175-E2D7C9308D80}" type="datetimeFigureOut">
               <a:rPr lang="en-US" smtClean="0"/>
-              <a:t>10/12/2024</a:t>
+              <a:t>1/13/2025</a:t>
             </a:fld>
             <a:endParaRPr lang="en-US"/>
           </a:p>
@@ -1387,7 +1387,7 @@
           <a:p>
             <a:fld id="{3138BA51-D3EA-CD41-976F-9A9696589CDF}" type="datetimeFigureOut">
               <a:rPr lang="en-US" smtClean="0"/>
-              <a:t>10/12/2024</a:t>
+              <a:t>1/13/2025</a:t>
             </a:fld>
             <a:endParaRPr lang="en-US"/>
           </a:p>
@@ -1555,7 +1555,7 @@
           <a:p>
             <a:fld id="{3138BA51-D3EA-CD41-976F-9A9696589CDF}" type="datetimeFigureOut">
               <a:rPr lang="en-US" smtClean="0"/>
-              <a:t>10/12/2024</a:t>
+              <a:t>1/13/2025</a:t>
             </a:fld>
             <a:endParaRPr lang="en-US"/>
           </a:p>
@@ -1733,7 +1733,7 @@
           <a:p>
             <a:fld id="{3138BA51-D3EA-CD41-976F-9A9696589CDF}" type="datetimeFigureOut">
               <a:rPr lang="en-US" smtClean="0"/>
-              <a:t>10/12/2024</a:t>
+              <a:t>1/13/2025</a:t>
             </a:fld>
             <a:endParaRPr lang="en-US"/>
           </a:p>
@@ -1816,7 +1816,7 @@
           <p:cNvPr id="8" name="Google Shape;54;p1">
             <a:extLst>
               <a:ext uri="{FF2B5EF4-FFF2-40B4-BE49-F238E27FC236}">
-                <a16:creationId xmlns:a16="http://schemas.microsoft.com/office/drawing/2014/main" id="{631C2DF5-1362-47E0-9992-CA0F5EE5E7F4}"/>
+                <a16:creationId xmlns:a16="http://schemas.microsoft.com/office/drawing/2014/main" xmlns="" id="{631C2DF5-1362-47E0-9992-CA0F5EE5E7F4}"/>
               </a:ext>
             </a:extLst>
           </p:cNvPr>
@@ -1903,7 +1903,7 @@
           <p:cNvPr id="9" name="Google Shape;55;p1">
             <a:extLst>
               <a:ext uri="{FF2B5EF4-FFF2-40B4-BE49-F238E27FC236}">
-                <a16:creationId xmlns:a16="http://schemas.microsoft.com/office/drawing/2014/main" id="{E5E4EFC6-10AC-457A-90BE-EB16C5D5FDC1}"/>
+                <a16:creationId xmlns:a16="http://schemas.microsoft.com/office/drawing/2014/main" xmlns="" id="{E5E4EFC6-10AC-457A-90BE-EB16C5D5FDC1}"/>
               </a:ext>
             </a:extLst>
           </p:cNvPr>
@@ -1975,7 +1975,7 @@
           <p:cNvPr id="10" name="Oval 9">
             <a:extLst>
               <a:ext uri="{FF2B5EF4-FFF2-40B4-BE49-F238E27FC236}">
-                <a16:creationId xmlns:a16="http://schemas.microsoft.com/office/drawing/2014/main" id="{38DC77A7-8710-436F-B5E7-19B60E66B5F0}"/>
+                <a16:creationId xmlns:a16="http://schemas.microsoft.com/office/drawing/2014/main" xmlns="" id="{38DC77A7-8710-436F-B5E7-19B60E66B5F0}"/>
               </a:ext>
             </a:extLst>
           </p:cNvPr>
@@ -2018,7 +2018,7 @@
           <a:lstStyle/>
           <a:p>
             <a:pPr algn="ctr"/>
-            <a:endParaRPr lang="en-KW" sz="2400"/>
+            <a:endParaRPr lang="x-none" sz="2400"/>
           </a:p>
         </p:txBody>
       </p:sp>
@@ -2027,7 +2027,7 @@
           <p:cNvPr id="11" name="Picture 10" descr="A red and white background with a design&#10;&#10;Description automatically generated">
             <a:extLst>
               <a:ext uri="{FF2B5EF4-FFF2-40B4-BE49-F238E27FC236}">
-                <a16:creationId xmlns:a16="http://schemas.microsoft.com/office/drawing/2014/main" id="{418E62F8-02A7-4379-A005-0EF5EC635BBF}"/>
+                <a16:creationId xmlns:a16="http://schemas.microsoft.com/office/drawing/2014/main" xmlns="" id="{418E62F8-02A7-4379-A005-0EF5EC635BBF}"/>
               </a:ext>
             </a:extLst>
           </p:cNvPr>
@@ -2057,7 +2057,7 @@
           <p:cNvPr id="12" name="Picture 11">
             <a:extLst>
               <a:ext uri="{FF2B5EF4-FFF2-40B4-BE49-F238E27FC236}">
-                <a16:creationId xmlns:a16="http://schemas.microsoft.com/office/drawing/2014/main" id="{28A0ADE9-7A46-486B-82F3-A690D904DFF4}"/>
+                <a16:creationId xmlns:a16="http://schemas.microsoft.com/office/drawing/2014/main" xmlns="" id="{28A0ADE9-7A46-486B-82F3-A690D904DFF4}"/>
               </a:ext>
             </a:extLst>
           </p:cNvPr>
@@ -2117,7 +2117,7 @@
           <p:cNvPr id="25" name="Rectangle 24">
             <a:extLst>
               <a:ext uri="{FF2B5EF4-FFF2-40B4-BE49-F238E27FC236}">
-                <a16:creationId xmlns:a16="http://schemas.microsoft.com/office/drawing/2014/main" id="{669E0535-6FD9-4D8F-80CA-FF7A96DB665F}"/>
+                <a16:creationId xmlns:a16="http://schemas.microsoft.com/office/drawing/2014/main" xmlns="" id="{669E0535-6FD9-4D8F-80CA-FF7A96DB665F}"/>
               </a:ext>
             </a:extLst>
           </p:cNvPr>
@@ -2160,7 +2160,7 @@
           <a:lstStyle/>
           <a:p>
             <a:pPr algn="ctr"/>
-            <a:endParaRPr lang="en-KW" sz="2400"/>
+            <a:endParaRPr lang="x-none" sz="2400"/>
           </a:p>
         </p:txBody>
       </p:sp>
@@ -2169,7 +2169,7 @@
           <p:cNvPr id="26" name="Picture 25" descr="A black and red background with a bird&#10;&#10;Description automatically generated">
             <a:extLst>
               <a:ext uri="{FF2B5EF4-FFF2-40B4-BE49-F238E27FC236}">
-                <a16:creationId xmlns:a16="http://schemas.microsoft.com/office/drawing/2014/main" id="{7356EFA9-D406-4147-B1F7-82B217840839}"/>
+                <a16:creationId xmlns:a16="http://schemas.microsoft.com/office/drawing/2014/main" xmlns="" id="{7356EFA9-D406-4147-B1F7-82B217840839}"/>
               </a:ext>
             </a:extLst>
           </p:cNvPr>
@@ -2199,7 +2199,7 @@
           <p:cNvPr id="27" name="Google Shape;15;p13">
             <a:extLst>
               <a:ext uri="{FF2B5EF4-FFF2-40B4-BE49-F238E27FC236}">
-                <a16:creationId xmlns:a16="http://schemas.microsoft.com/office/drawing/2014/main" id="{F5F3B15A-58C1-48A3-AB6A-E8A3A8F0B1F0}"/>
+                <a16:creationId xmlns:a16="http://schemas.microsoft.com/office/drawing/2014/main" xmlns="" id="{F5F3B15A-58C1-48A3-AB6A-E8A3A8F0B1F0}"/>
               </a:ext>
             </a:extLst>
           </p:cNvPr>
@@ -2365,7 +2365,7 @@
           <p:cNvPr id="28" name="Google Shape;19;p14">
             <a:extLst>
               <a:ext uri="{FF2B5EF4-FFF2-40B4-BE49-F238E27FC236}">
-                <a16:creationId xmlns:a16="http://schemas.microsoft.com/office/drawing/2014/main" id="{A6353D6C-199F-4C21-9FC8-2D00FAAA26A6}"/>
+                <a16:creationId xmlns:a16="http://schemas.microsoft.com/office/drawing/2014/main" xmlns="" id="{A6353D6C-199F-4C21-9FC8-2D00FAAA26A6}"/>
               </a:ext>
             </a:extLst>
           </p:cNvPr>
@@ -2644,7 +2644,7 @@
           <p:cNvPr id="29" name="Google Shape;55;p1">
             <a:extLst>
               <a:ext uri="{FF2B5EF4-FFF2-40B4-BE49-F238E27FC236}">
-                <a16:creationId xmlns:a16="http://schemas.microsoft.com/office/drawing/2014/main" id="{4544F053-DAFF-4191-A4FE-EAC318BF6A0C}"/>
+                <a16:creationId xmlns:a16="http://schemas.microsoft.com/office/drawing/2014/main" xmlns="" id="{4544F053-DAFF-4191-A4FE-EAC318BF6A0C}"/>
               </a:ext>
             </a:extLst>
           </p:cNvPr>
@@ -2716,7 +2716,7 @@
           <p:cNvPr id="2" name="Title 1">
             <a:extLst>
               <a:ext uri="{FF2B5EF4-FFF2-40B4-BE49-F238E27FC236}">
-                <a16:creationId xmlns:a16="http://schemas.microsoft.com/office/drawing/2014/main" id="{7B6E2517-3805-41A0-9280-523D3C8CC82F}"/>
+                <a16:creationId xmlns:a16="http://schemas.microsoft.com/office/drawing/2014/main" xmlns="" id="{7B6E2517-3805-41A0-9280-523D3C8CC82F}"/>
               </a:ext>
             </a:extLst>
           </p:cNvPr>
@@ -2873,7 +2873,7 @@
           <a:p>
             <a:fld id="{3138BA51-D3EA-CD41-976F-9A9696589CDF}" type="datetimeFigureOut">
               <a:rPr lang="en-US" smtClean="0"/>
-              <a:t>10/12/2024</a:t>
+              <a:t>1/13/2025</a:t>
             </a:fld>
             <a:endParaRPr lang="en-US"/>
           </a:p>
@@ -3118,7 +3118,7 @@
           <a:p>
             <a:fld id="{3138BA51-D3EA-CD41-976F-9A9696589CDF}" type="datetimeFigureOut">
               <a:rPr lang="en-US" smtClean="0"/>
-              <a:t>10/12/2024</a:t>
+              <a:t>1/13/2025</a:t>
             </a:fld>
             <a:endParaRPr lang="en-US"/>
           </a:p>
@@ -3347,7 +3347,7 @@
           <a:p>
             <a:fld id="{3138BA51-D3EA-CD41-976F-9A9696589CDF}" type="datetimeFigureOut">
               <a:rPr lang="en-US" smtClean="0"/>
-              <a:t>10/12/2024</a:t>
+              <a:t>1/13/2025</a:t>
             </a:fld>
             <a:endParaRPr lang="en-US"/>
           </a:p>
@@ -3711,7 +3711,7 @@
           <a:p>
             <a:fld id="{3138BA51-D3EA-CD41-976F-9A9696589CDF}" type="datetimeFigureOut">
               <a:rPr lang="en-US" smtClean="0"/>
-              <a:t>10/12/2024</a:t>
+              <a:t>1/13/2025</a:t>
             </a:fld>
             <a:endParaRPr lang="en-US"/>
           </a:p>
@@ -3828,7 +3828,7 @@
           <a:p>
             <a:fld id="{3138BA51-D3EA-CD41-976F-9A9696589CDF}" type="datetimeFigureOut">
               <a:rPr lang="en-US" smtClean="0"/>
-              <a:t>10/12/2024</a:t>
+              <a:t>1/13/2025</a:t>
             </a:fld>
             <a:endParaRPr lang="en-US"/>
           </a:p>
@@ -3923,7 +3923,7 @@
           <a:p>
             <a:fld id="{3138BA51-D3EA-CD41-976F-9A9696589CDF}" type="datetimeFigureOut">
               <a:rPr lang="en-US" smtClean="0"/>
-              <a:t>10/12/2024</a:t>
+              <a:t>1/13/2025</a:t>
             </a:fld>
             <a:endParaRPr lang="en-US"/>
           </a:p>
@@ -4198,7 +4198,7 @@
           <a:p>
             <a:fld id="{3138BA51-D3EA-CD41-976F-9A9696589CDF}" type="datetimeFigureOut">
               <a:rPr lang="en-US" smtClean="0"/>
-              <a:t>10/12/2024</a:t>
+              <a:t>1/13/2025</a:t>
             </a:fld>
             <a:endParaRPr lang="en-US"/>
           </a:p>
@@ -4450,7 +4450,7 @@
           <a:p>
             <a:fld id="{3138BA51-D3EA-CD41-976F-9A9696589CDF}" type="datetimeFigureOut">
               <a:rPr lang="en-US" smtClean="0"/>
-              <a:t>10/12/2024</a:t>
+              <a:t>1/13/2025</a:t>
             </a:fld>
             <a:endParaRPr lang="en-US"/>
           </a:p>
@@ -4670,7 +4670,7 @@
           <a:p>
             <a:fld id="{3138BA51-D3EA-CD41-976F-9A9696589CDF}" type="datetimeFigureOut">
               <a:rPr lang="en-US" smtClean="0"/>
-              <a:t>10/12/2024</a:t>
+              <a:t>1/13/2025</a:t>
             </a:fld>
             <a:endParaRPr lang="en-US"/>
           </a:p>
@@ -5111,7 +5111,7 @@
             <a:r>
               <a:rPr lang="en-US" sz="3600" b="1" dirty="0">
                 <a:solidFill>
-                  <a:srgbClr val="00B050"/>
+                  <a:srgbClr val="0000FF"/>
                 </a:solidFill>
                 <a:latin typeface="Arial" pitchFamily="34" charset="0"/>
                 <a:cs typeface="Arial" pitchFamily="34" charset="0"/>
@@ -5124,7 +5124,7 @@
             <a:r>
               <a:rPr lang="x-none" sz="3600" b="1" dirty="0">
                 <a:solidFill>
-                  <a:srgbClr val="00B050"/>
+                  <a:srgbClr val="0000FF"/>
                 </a:solidFill>
                 <a:latin typeface="Arial" pitchFamily="34" charset="0"/>
                 <a:cs typeface="Arial" pitchFamily="34" charset="0"/>
@@ -5134,7 +5134,7 @@
             <a:r>
               <a:rPr lang="en-US" sz="3600" b="1" dirty="0">
                 <a:solidFill>
-                  <a:srgbClr val="00B050"/>
+                  <a:srgbClr val="0000FF"/>
                 </a:solidFill>
                 <a:latin typeface="Arial" pitchFamily="34" charset="0"/>
                 <a:cs typeface="Arial" pitchFamily="34" charset="0"/>
@@ -5144,23 +5144,40 @@
             <a:r>
               <a:rPr lang="x-none" sz="3600" b="1" dirty="0">
                 <a:solidFill>
-                  <a:srgbClr val="00B050"/>
+                  <a:srgbClr val="0000FF"/>
                 </a:solidFill>
                 <a:latin typeface="Arial" pitchFamily="34" charset="0"/>
                 <a:cs typeface="Arial" pitchFamily="34" charset="0"/>
               </a:rPr>
-              <a:t> 20</a:t>
+              <a:t> </a:t>
             </a:r>
             <a:r>
-              <a:rPr lang="en-US" sz="3600" b="1" dirty="0">
+              <a:rPr lang="x-none" sz="3600" b="1">
                 <a:solidFill>
-                  <a:srgbClr val="00B050"/>
+                  <a:srgbClr val="0000FF"/>
                 </a:solidFill>
                 <a:latin typeface="Arial" pitchFamily="34" charset="0"/>
                 <a:cs typeface="Arial" pitchFamily="34" charset="0"/>
               </a:rPr>
-              <a:t>2</a:t>
+              <a:t>20</a:t>
             </a:r>
+            <a:r>
+              <a:rPr lang="en-US" sz="3600" b="1" dirty="0" smtClean="0">
+                <a:solidFill>
+                  <a:srgbClr val="0000FF"/>
+                </a:solidFill>
+                <a:latin typeface="Arial" pitchFamily="34" charset="0"/>
+                <a:cs typeface="Arial" pitchFamily="34" charset="0"/>
+              </a:rPr>
+              <a:t>2 – Spring 2025</a:t>
+            </a:r>
+            <a:endParaRPr lang="en-US" sz="3600" b="1" dirty="0">
+              <a:solidFill>
+                <a:srgbClr val="0000FF"/>
+              </a:solidFill>
+              <a:latin typeface="Arial" pitchFamily="34" charset="0"/>
+              <a:cs typeface="Arial" pitchFamily="34" charset="0"/>
+            </a:endParaRPr>
           </a:p>
         </p:txBody>
       </p:sp>
@@ -5169,7 +5186,7 @@
           <p:cNvPr id="2" name="TextBox 1">
             <a:extLst>
               <a:ext uri="{FF2B5EF4-FFF2-40B4-BE49-F238E27FC236}">
-                <a16:creationId xmlns:a16="http://schemas.microsoft.com/office/drawing/2014/main" id="{07DEEC26-75A9-F4A2-6948-691F17B753B2}"/>
+                <a16:creationId xmlns:a16="http://schemas.microsoft.com/office/drawing/2014/main" xmlns="" id="{07DEEC26-75A9-F4A2-6948-691F17B753B2}"/>
               </a:ext>
             </a:extLst>
           </p:cNvPr>
@@ -5195,7 +5212,7 @@
             <a:r>
               <a:rPr lang="en-US" sz="4400" b="1" dirty="0">
                 <a:solidFill>
-                  <a:srgbClr val="0000FF"/>
+                  <a:srgbClr val="00B050"/>
                 </a:solidFill>
                 <a:latin typeface="Cambria" panose="02040503050406030204" pitchFamily="18" charset="0"/>
               </a:rPr>
@@ -5357,7 +5374,7 @@
                             <a:solidFill>
                               <a:schemeClr val="tx1"/>
                             </a:solidFill>
-                            <a:latin typeface="Cambria Math" panose="02040503050406030204" pitchFamily="18" charset="0"/>
+                            <a:latin typeface="Cambria Math"/>
                             <a:ea typeface="Cambria Math" panose="02040503050406030204" pitchFamily="18" charset="0"/>
                           </a:rPr>
                         </m:ctrlPr>
@@ -5392,7 +5409,7 @@
                             <a:solidFill>
                               <a:schemeClr val="tx1"/>
                             </a:solidFill>
-                            <a:latin typeface="Cambria Math" panose="02040503050406030204" pitchFamily="18" charset="0"/>
+                            <a:latin typeface="Cambria Math"/>
                             <a:ea typeface="Cambria Math" panose="02040503050406030204" pitchFamily="18" charset="0"/>
                           </a:rPr>
                         </m:ctrlPr>
@@ -5420,7 +5437,7 @@
                                 <a:solidFill>
                                   <a:schemeClr val="tx1"/>
                                 </a:solidFill>
-                                <a:latin typeface="Cambria Math" panose="02040503050406030204" pitchFamily="18" charset="0"/>
+                                <a:latin typeface="Cambria Math"/>
                                 <a:ea typeface="Cambria Math" panose="02040503050406030204" pitchFamily="18" charset="0"/>
                               </a:rPr>
                             </m:ctrlPr>
@@ -5465,7 +5482,7 @@
                                 <a:solidFill>
                                   <a:schemeClr val="tx1"/>
                                 </a:solidFill>
-                                <a:latin typeface="Cambria Math" panose="02040503050406030204" pitchFamily="18" charset="0"/>
+                                <a:latin typeface="Cambria Math"/>
                                 <a:ea typeface="Cambria Math" panose="02040503050406030204" pitchFamily="18" charset="0"/>
                               </a:rPr>
                             </m:ctrlPr>
@@ -5502,7 +5519,7 @@
                                 <a:solidFill>
                                   <a:schemeClr val="tx1"/>
                                 </a:solidFill>
-                                <a:latin typeface="Cambria Math" panose="02040503050406030204" pitchFamily="18" charset="0"/>
+                                <a:latin typeface="Cambria Math"/>
                                 <a:ea typeface="Cambria Math" panose="02040503050406030204" pitchFamily="18" charset="0"/>
                               </a:rPr>
                             </m:ctrlPr>
@@ -5512,7 +5529,7 @@
                               <m:fPr>
                                 <m:ctrlPr>
                                   <a:rPr lang="en-US" sz="3200" i="1">
-                                    <a:latin typeface="Cambria Math" panose="02040503050406030204" pitchFamily="18" charset="0"/>
+                                    <a:latin typeface="Cambria Math"/>
                                     <a:ea typeface="Cambria Math" panose="02040503050406030204" pitchFamily="18" charset="0"/>
                                   </a:rPr>
                                 </m:ctrlPr>
@@ -5522,7 +5539,7 @@
                                   <m:sSupPr>
                                     <m:ctrlPr>
                                       <a:rPr lang="en-US" sz="3200" i="1">
-                                        <a:latin typeface="Cambria Math" panose="02040503050406030204" pitchFamily="18" charset="0"/>
+                                        <a:latin typeface="Cambria Math"/>
                                         <a:ea typeface="Cambria Math" panose="02040503050406030204" pitchFamily="18" charset="0"/>
                                       </a:rPr>
                                     </m:ctrlPr>
@@ -5588,7 +5605,7 @@
                               <m:fPr>
                                 <m:ctrlPr>
                                   <a:rPr lang="en-US" sz="3200" i="1">
-                                    <a:latin typeface="Cambria Math" panose="02040503050406030204" pitchFamily="18" charset="0"/>
+                                    <a:latin typeface="Cambria Math"/>
                                     <a:ea typeface="Cambria Math" panose="02040503050406030204" pitchFamily="18" charset="0"/>
                                   </a:rPr>
                                 </m:ctrlPr>
@@ -5598,7 +5615,7 @@
                                   <m:sSupPr>
                                     <m:ctrlPr>
                                       <a:rPr lang="en-US" sz="3200" i="1">
-                                        <a:latin typeface="Cambria Math" panose="02040503050406030204" pitchFamily="18" charset="0"/>
+                                        <a:latin typeface="Cambria Math"/>
                                         <a:ea typeface="Cambria Math" panose="02040503050406030204" pitchFamily="18" charset="0"/>
                                       </a:rPr>
                                     </m:ctrlPr>
@@ -5827,7 +5844,7 @@
                             <a:solidFill>
                               <a:srgbClr val="0000FF"/>
                             </a:solidFill>
-                            <a:latin typeface="Cambria Math" panose="02040503050406030204" pitchFamily="18" charset="0"/>
+                            <a:latin typeface="Cambria Math"/>
                           </a:rPr>
                         </m:ctrlPr>
                       </m:fPr>
@@ -5983,7 +6000,7 @@
                             <a:solidFill>
                               <a:schemeClr val="tx1"/>
                             </a:solidFill>
-                            <a:latin typeface="Cambria Math" panose="02040503050406030204" pitchFamily="18" charset="0"/>
+                            <a:latin typeface="Cambria Math"/>
                             <a:ea typeface="Cambria Math" panose="02040503050406030204" pitchFamily="18" charset="0"/>
                           </a:rPr>
                         </m:ctrlPr>
@@ -6048,7 +6065,7 @@
                                 <a:solidFill>
                                   <a:schemeClr val="tx1"/>
                                 </a:solidFill>
-                                <a:latin typeface="Cambria Math" panose="02040503050406030204" pitchFamily="18" charset="0"/>
+                                <a:latin typeface="Cambria Math"/>
                                 <a:ea typeface="Cambria Math" panose="02040503050406030204" pitchFamily="18" charset="0"/>
                               </a:rPr>
                             </m:ctrlPr>
@@ -6095,7 +6112,7 @@
                                 <a:solidFill>
                                   <a:schemeClr val="tx1"/>
                                 </a:solidFill>
-                                <a:latin typeface="Cambria Math" panose="02040503050406030204" pitchFamily="18" charset="0"/>
+                                <a:latin typeface="Cambria Math"/>
                                 <a:ea typeface="Cambria Math" panose="02040503050406030204" pitchFamily="18" charset="0"/>
                               </a:rPr>
                             </m:ctrlPr>
@@ -6175,7 +6192,7 @@
                                 <a:solidFill>
                                   <a:schemeClr val="tx1"/>
                                 </a:solidFill>
-                                <a:latin typeface="Cambria Math" panose="02040503050406030204" pitchFamily="18" charset="0"/>
+                                <a:latin typeface="Cambria Math"/>
                                 <a:ea typeface="Cambria Math" panose="02040503050406030204" pitchFamily="18" charset="0"/>
                               </a:rPr>
                             </m:ctrlPr>
@@ -6271,7 +6288,7 @@
                             <a:solidFill>
                               <a:schemeClr val="tx1"/>
                             </a:solidFill>
-                            <a:latin typeface="Cambria Math" panose="02040503050406030204" pitchFamily="18" charset="0"/>
+                            <a:latin typeface="Cambria Math"/>
                             <a:ea typeface="Cambria Math" panose="02040503050406030204" pitchFamily="18" charset="0"/>
                           </a:rPr>
                         </m:ctrlPr>
@@ -6310,7 +6327,7 @@
                             <a:solidFill>
                               <a:schemeClr val="tx1"/>
                             </a:solidFill>
-                            <a:latin typeface="Cambria Math" panose="02040503050406030204" pitchFamily="18" charset="0"/>
+                            <a:latin typeface="Cambria Math"/>
                             <a:ea typeface="Cambria Math" panose="02040503050406030204" pitchFamily="18" charset="0"/>
                           </a:rPr>
                         </m:ctrlPr>
@@ -6323,7 +6340,7 @@
                                 <a:solidFill>
                                   <a:schemeClr val="tx1"/>
                                 </a:solidFill>
-                                <a:latin typeface="Cambria Math" panose="02040503050406030204" pitchFamily="18" charset="0"/>
+                                <a:latin typeface="Cambria Math"/>
                                 <a:ea typeface="Cambria Math" panose="02040503050406030204" pitchFamily="18" charset="0"/>
                               </a:rPr>
                             </m:ctrlPr>
@@ -6434,7 +6451,7 @@
                                     <a:solidFill>
                                       <a:schemeClr val="tx1"/>
                                     </a:solidFill>
-                                    <a:latin typeface="Cambria Math" panose="02040503050406030204" pitchFamily="18" charset="0"/>
+                                    <a:latin typeface="Cambria Math"/>
                                     <a:ea typeface="Cambria Math" panose="02040503050406030204" pitchFamily="18" charset="0"/>
                                   </a:rPr>
                                 </m:ctrlPr>
@@ -6481,7 +6498,7 @@
                                     <a:solidFill>
                                       <a:schemeClr val="tx1"/>
                                     </a:solidFill>
-                                    <a:latin typeface="Cambria Math" panose="02040503050406030204" pitchFamily="18" charset="0"/>
+                                    <a:latin typeface="Cambria Math"/>
                                     <a:ea typeface="Cambria Math" panose="02040503050406030204" pitchFamily="18" charset="0"/>
                                   </a:rPr>
                                 </m:ctrlPr>
@@ -6535,7 +6552,7 @@
                             <a:solidFill>
                               <a:schemeClr val="tx1"/>
                             </a:solidFill>
-                            <a:latin typeface="Cambria Math" panose="02040503050406030204" pitchFamily="18" charset="0"/>
+                            <a:latin typeface="Cambria Math"/>
                             <a:ea typeface="Cambria Math" panose="02040503050406030204" pitchFamily="18" charset="0"/>
                           </a:rPr>
                         </m:ctrlPr>
@@ -6560,7 +6577,7 @@
                                 <a:solidFill>
                                   <a:schemeClr val="tx1"/>
                                 </a:solidFill>
-                                <a:latin typeface="Cambria Math" panose="02040503050406030204" pitchFamily="18" charset="0"/>
+                                <a:latin typeface="Cambria Math"/>
                                 <a:ea typeface="Cambria Math" panose="02040503050406030204" pitchFamily="18" charset="0"/>
                               </a:rPr>
                             </m:ctrlPr>
@@ -6607,7 +6624,7 @@
                                 <a:solidFill>
                                   <a:schemeClr val="tx1"/>
                                 </a:solidFill>
-                                <a:latin typeface="Cambria Math" panose="02040503050406030204" pitchFamily="18" charset="0"/>
+                                <a:latin typeface="Cambria Math"/>
                                 <a:ea typeface="Cambria Math" panose="02040503050406030204" pitchFamily="18" charset="0"/>
                               </a:rPr>
                             </m:ctrlPr>
@@ -6771,7 +6788,11 @@
           </a:lstStyle>
           <a:p>
             <a:r>
-              <a:rPr lang="en-US" dirty="0"/>
+              <a:rPr lang="en-US" dirty="0">
+                <a:solidFill>
+                  <a:srgbClr val="00B050"/>
+                </a:solidFill>
+              </a:rPr>
               <a:t>Exercise (p. 576)</a:t>
             </a:r>
           </a:p>
@@ -6895,7 +6916,7 @@
                             <a:solidFill>
                               <a:schemeClr val="tx1"/>
                             </a:solidFill>
-                            <a:latin typeface="Cambria Math" panose="02040503050406030204" pitchFamily="18" charset="0"/>
+                            <a:latin typeface="Cambria Math"/>
                             <a:ea typeface="Cambria Math" panose="02040503050406030204" pitchFamily="18" charset="0"/>
                           </a:rPr>
                         </m:ctrlPr>
@@ -6972,7 +6993,7 @@
                             <a:solidFill>
                               <a:schemeClr val="tx1"/>
                             </a:solidFill>
-                            <a:latin typeface="Cambria Math" panose="02040503050406030204" pitchFamily="18" charset="0"/>
+                            <a:latin typeface="Cambria Math"/>
                             <a:ea typeface="Cambria Math" panose="02040503050406030204" pitchFamily="18" charset="0"/>
                           </a:rPr>
                         </m:ctrlPr>
@@ -7057,7 +7078,7 @@
                                 <a:solidFill>
                                   <a:schemeClr val="tx1"/>
                                 </a:solidFill>
-                                <a:latin typeface="Cambria Math" panose="02040503050406030204" pitchFamily="18" charset="0"/>
+                                <a:latin typeface="Cambria Math"/>
                                 <a:ea typeface="Cambria Math" panose="02040503050406030204" pitchFamily="18" charset="0"/>
                               </a:rPr>
                             </m:ctrlPr>
@@ -7134,7 +7155,7 @@
                                 <a:solidFill>
                                   <a:schemeClr val="tx1"/>
                                 </a:solidFill>
-                                <a:latin typeface="Cambria Math" panose="02040503050406030204" pitchFamily="18" charset="0"/>
+                                <a:latin typeface="Cambria Math"/>
                                 <a:ea typeface="Cambria Math" panose="02040503050406030204" pitchFamily="18" charset="0"/>
                               </a:rPr>
                             </m:ctrlPr>
@@ -7187,7 +7208,7 @@
                             <a:solidFill>
                               <a:schemeClr val="tx1"/>
                             </a:solidFill>
-                            <a:latin typeface="Cambria Math" panose="02040503050406030204" pitchFamily="18" charset="0"/>
+                            <a:latin typeface="Cambria Math"/>
                             <a:ea typeface="Cambria Math" panose="02040503050406030204" pitchFamily="18" charset="0"/>
                           </a:rPr>
                         </m:ctrlPr>
@@ -7262,7 +7283,7 @@
                                 <a:solidFill>
                                   <a:schemeClr val="tx1"/>
                                 </a:solidFill>
-                                <a:latin typeface="Cambria Math" panose="02040503050406030204" pitchFamily="18" charset="0"/>
+                                <a:latin typeface="Cambria Math"/>
                                 <a:ea typeface="Cambria Math" panose="02040503050406030204" pitchFamily="18" charset="0"/>
                               </a:rPr>
                             </m:ctrlPr>
@@ -7431,7 +7452,11 @@
           </a:lstStyle>
           <a:p>
             <a:r>
-              <a:rPr lang="en-US" dirty="0"/>
+              <a:rPr lang="en-US" dirty="0">
+                <a:solidFill>
+                  <a:srgbClr val="00B050"/>
+                </a:solidFill>
+              </a:rPr>
               <a:t>Additional example 3</a:t>
             </a:r>
           </a:p>
@@ -7722,7 +7747,11 @@
           </a:lstStyle>
           <a:p>
             <a:r>
-              <a:rPr lang="en-US" dirty="0"/>
+              <a:rPr lang="en-US" dirty="0">
+                <a:solidFill>
+                  <a:srgbClr val="00B050"/>
+                </a:solidFill>
+              </a:rPr>
               <a:t>Additional example 4</a:t>
             </a:r>
           </a:p>
@@ -7762,7 +7791,7 @@
                             <a:solidFill>
                               <a:schemeClr val="tx1"/>
                             </a:solidFill>
-                            <a:latin typeface="Cambria Math" panose="02040503050406030204" pitchFamily="18" charset="0"/>
+                            <a:latin typeface="Cambria Math"/>
                           </a:rPr>
                         </m:ctrlPr>
                       </m:sSubPr>
@@ -7796,7 +7825,7 @@
                             <a:solidFill>
                               <a:schemeClr val="tx1"/>
                             </a:solidFill>
-                            <a:latin typeface="Cambria Math" panose="02040503050406030204" pitchFamily="18" charset="0"/>
+                            <a:latin typeface="Cambria Math"/>
                           </a:rPr>
                         </m:ctrlPr>
                       </m:dPr>
@@ -8044,7 +8073,7 @@
                             <a:solidFill>
                               <a:schemeClr val="tx1"/>
                             </a:solidFill>
-                            <a:latin typeface="Cambria Math" panose="02040503050406030204" pitchFamily="18" charset="0"/>
+                            <a:latin typeface="Cambria Math"/>
                           </a:rPr>
                         </m:ctrlPr>
                       </m:sSubPr>
@@ -8087,7 +8116,7 @@
                             <a:solidFill>
                               <a:schemeClr val="tx1"/>
                             </a:solidFill>
-                            <a:latin typeface="Cambria Math" panose="02040503050406030204" pitchFamily="18" charset="0"/>
+                            <a:latin typeface="Cambria Math"/>
                           </a:rPr>
                         </m:ctrlPr>
                       </m:dPr>
@@ -8191,7 +8220,7 @@
                             <a:solidFill>
                               <a:schemeClr val="tx1"/>
                             </a:solidFill>
-                            <a:latin typeface="Cambria Math" panose="02040503050406030204" pitchFamily="18" charset="0"/>
+                            <a:latin typeface="Cambria Math"/>
                           </a:rPr>
                         </m:ctrlPr>
                       </m:sSubPr>
@@ -8225,7 +8254,7 @@
                             <a:solidFill>
                               <a:schemeClr val="tx1"/>
                             </a:solidFill>
-                            <a:latin typeface="Cambria Math" panose="02040503050406030204" pitchFamily="18" charset="0"/>
+                            <a:latin typeface="Cambria Math"/>
                           </a:rPr>
                         </m:ctrlPr>
                       </m:dPr>
@@ -8266,7 +8295,7 @@
                             <a:solidFill>
                               <a:schemeClr val="tx1"/>
                             </a:solidFill>
-                            <a:latin typeface="Cambria Math" panose="02040503050406030204" pitchFamily="18" charset="0"/>
+                            <a:latin typeface="Cambria Math"/>
                           </a:rPr>
                         </m:ctrlPr>
                       </m:fPr>
@@ -8316,7 +8345,7 @@
                                 <a:solidFill>
                                   <a:schemeClr val="tx1"/>
                                 </a:solidFill>
-                                <a:latin typeface="Cambria Math" panose="02040503050406030204" pitchFamily="18" charset="0"/>
+                                <a:latin typeface="Cambria Math"/>
                               </a:rPr>
                             </m:ctrlPr>
                           </m:sSupPr>
@@ -8374,7 +8403,7 @@
                             <a:solidFill>
                               <a:schemeClr val="tx1"/>
                             </a:solidFill>
-                            <a:latin typeface="Cambria Math" panose="02040503050406030204" pitchFamily="18" charset="0"/>
+                            <a:latin typeface="Cambria Math"/>
                           </a:rPr>
                         </m:ctrlPr>
                       </m:fPr>
@@ -8424,7 +8453,7 @@
                                 <a:solidFill>
                                   <a:schemeClr val="tx1"/>
                                 </a:solidFill>
-                                <a:latin typeface="Cambria Math" panose="02040503050406030204" pitchFamily="18" charset="0"/>
+                                <a:latin typeface="Cambria Math"/>
                               </a:rPr>
                             </m:ctrlPr>
                           </m:sSupPr>
@@ -8546,7 +8575,7 @@
                             <a:solidFill>
                               <a:schemeClr val="tx1"/>
                             </a:solidFill>
-                            <a:latin typeface="Cambria Math" panose="02040503050406030204" pitchFamily="18" charset="0"/>
+                            <a:latin typeface="Cambria Math"/>
                           </a:rPr>
                         </m:ctrlPr>
                       </m:sSubPr>
@@ -8878,7 +8907,7 @@
                               <a:solidFill>
                                 <a:schemeClr val="tx1"/>
                               </a:solidFill>
-                              <a:latin typeface="Cambria Math" panose="02040503050406030204" pitchFamily="18" charset="0"/>
+                              <a:latin typeface="Cambria Math"/>
                             </a:rPr>
                           </m:ctrlPr>
                         </m:sSubPr>
@@ -8912,7 +8941,7 @@
                               <a:solidFill>
                                 <a:schemeClr val="tx1"/>
                               </a:solidFill>
-                              <a:latin typeface="Cambria Math" panose="02040503050406030204" pitchFamily="18" charset="0"/>
+                              <a:latin typeface="Cambria Math"/>
                             </a:rPr>
                           </m:ctrlPr>
                         </m:dPr>
@@ -8953,7 +8982,7 @@
                               <a:solidFill>
                                 <a:schemeClr val="tx1"/>
                               </a:solidFill>
-                              <a:latin typeface="Cambria Math" panose="02040503050406030204" pitchFamily="18" charset="0"/>
+                              <a:latin typeface="Cambria Math"/>
                             </a:rPr>
                           </m:ctrlPr>
                         </m:fPr>
@@ -8987,7 +9016,7 @@
                               <a:solidFill>
                                 <a:schemeClr val="tx1"/>
                               </a:solidFill>
-                              <a:latin typeface="Cambria Math" panose="02040503050406030204" pitchFamily="18" charset="0"/>
+                              <a:latin typeface="Cambria Math"/>
                             </a:rPr>
                           </m:ctrlPr>
                         </m:sSubPr>
@@ -9021,7 +9050,7 @@
                               <a:solidFill>
                                 <a:schemeClr val="tx1"/>
                               </a:solidFill>
-                              <a:latin typeface="Cambria Math" panose="02040503050406030204" pitchFamily="18" charset="0"/>
+                              <a:latin typeface="Cambria Math"/>
                             </a:rPr>
                           </m:ctrlPr>
                         </m:dPr>
@@ -9120,7 +9149,7 @@
                             <a:solidFill>
                               <a:srgbClr val="0000FF"/>
                             </a:solidFill>
-                            <a:latin typeface="Cambria Math" panose="02040503050406030204" pitchFamily="18" charset="0"/>
+                            <a:latin typeface="Cambria Math"/>
                           </a:rPr>
                         </m:ctrlPr>
                       </m:sSubPr>
@@ -9154,7 +9183,7 @@
                             <a:solidFill>
                               <a:srgbClr val="0000FF"/>
                             </a:solidFill>
-                            <a:latin typeface="Cambria Math" panose="02040503050406030204" pitchFamily="18" charset="0"/>
+                            <a:latin typeface="Cambria Math"/>
                           </a:rPr>
                         </m:ctrlPr>
                       </m:dPr>
@@ -9195,7 +9224,7 @@
                             <a:solidFill>
                               <a:srgbClr val="0000FF"/>
                             </a:solidFill>
-                            <a:latin typeface="Cambria Math" panose="02040503050406030204" pitchFamily="18" charset="0"/>
+                            <a:latin typeface="Cambria Math"/>
                           </a:rPr>
                         </m:ctrlPr>
                       </m:fPr>
@@ -9229,7 +9258,7 @@
                             <a:solidFill>
                               <a:srgbClr val="0000FF"/>
                             </a:solidFill>
-                            <a:latin typeface="Cambria Math" panose="02040503050406030204" pitchFamily="18" charset="0"/>
+                            <a:latin typeface="Cambria Math"/>
                           </a:rPr>
                         </m:ctrlPr>
                       </m:dPr>
@@ -9241,7 +9270,7 @@
                                 <a:solidFill>
                                   <a:srgbClr val="0000FF"/>
                                 </a:solidFill>
-                                <a:latin typeface="Cambria Math" panose="02040503050406030204" pitchFamily="18" charset="0"/>
+                                <a:latin typeface="Cambria Math"/>
                               </a:rPr>
                             </m:ctrlPr>
                           </m:fPr>
@@ -9291,7 +9320,7 @@
                                     <a:solidFill>
                                       <a:srgbClr val="0000FF"/>
                                     </a:solidFill>
-                                    <a:latin typeface="Cambria Math" panose="02040503050406030204" pitchFamily="18" charset="0"/>
+                                    <a:latin typeface="Cambria Math"/>
                                   </a:rPr>
                                 </m:ctrlPr>
                               </m:sSupPr>
@@ -9371,7 +9400,7 @@
                             <a:solidFill>
                               <a:srgbClr val="0000FF"/>
                             </a:solidFill>
-                            <a:latin typeface="Cambria Math" panose="02040503050406030204" pitchFamily="18" charset="0"/>
+                            <a:latin typeface="Cambria Math"/>
                           </a:rPr>
                         </m:ctrlPr>
                       </m:fPr>
@@ -9466,7 +9495,7 @@
                                 <a:solidFill>
                                   <a:srgbClr val="0000FF"/>
                                 </a:solidFill>
-                                <a:latin typeface="Cambria Math" panose="02040503050406030204" pitchFamily="18" charset="0"/>
+                                <a:latin typeface="Cambria Math"/>
                               </a:rPr>
                             </m:ctrlPr>
                           </m:sSupPr>
@@ -9509,7 +9538,7 @@
                                 <a:solidFill>
                                   <a:srgbClr val="0000FF"/>
                                 </a:solidFill>
-                                <a:latin typeface="Cambria Math" panose="02040503050406030204" pitchFamily="18" charset="0"/>
+                                <a:latin typeface="Cambria Math"/>
                               </a:rPr>
                             </m:ctrlPr>
                           </m:sSupPr>
@@ -9704,7 +9733,11 @@
           </a:lstStyle>
           <a:p>
             <a:r>
-              <a:rPr lang="en-US" dirty="0"/>
+              <a:rPr lang="en-US" dirty="0">
+                <a:solidFill>
+                  <a:srgbClr val="00B050"/>
+                </a:solidFill>
+              </a:rPr>
               <a:t>Example 5</a:t>
             </a:r>
           </a:p>
@@ -9886,7 +9919,11 @@
           </a:lstStyle>
           <a:p>
             <a:r>
-              <a:rPr lang="en-US" dirty="0"/>
+              <a:rPr lang="en-US" dirty="0">
+                <a:solidFill>
+                  <a:srgbClr val="00B050"/>
+                </a:solidFill>
+              </a:rPr>
               <a:t>Example 6</a:t>
             </a:r>
           </a:p>
@@ -9929,7 +9966,7 @@
                       <m:dPr>
                         <m:ctrlPr>
                           <a:rPr lang="en-US" sz="3200" b="1" i="1" smtClean="0">
-                            <a:latin typeface="Cambria Math" panose="02040503050406030204" pitchFamily="18" charset="0"/>
+                            <a:latin typeface="Cambria Math"/>
                           </a:rPr>
                         </m:ctrlPr>
                       </m:dPr>
@@ -9964,7 +10001,7 @@
                             <a:solidFill>
                               <a:schemeClr val="tx1"/>
                             </a:solidFill>
-                            <a:latin typeface="Cambria Math" panose="02040503050406030204" pitchFamily="18" charset="0"/>
+                            <a:latin typeface="Cambria Math"/>
                           </a:rPr>
                         </m:ctrlPr>
                       </m:fPr>
@@ -9984,7 +10021,7 @@
                           <m:sSupPr>
                             <m:ctrlPr>
                               <a:rPr lang="en-US" sz="3200" b="1" i="1" dirty="0">
-                                <a:latin typeface="Cambria Math" panose="02040503050406030204" pitchFamily="18" charset="0"/>
+                                <a:latin typeface="Cambria Math"/>
                               </a:rPr>
                             </m:ctrlPr>
                           </m:sSupPr>
@@ -10039,7 +10076,7 @@
                       <m:fPr>
                         <m:ctrlPr>
                           <a:rPr lang="en-US" sz="3200" b="1" i="1" dirty="0">
-                            <a:latin typeface="Cambria Math" panose="02040503050406030204" pitchFamily="18" charset="0"/>
+                            <a:latin typeface="Cambria Math"/>
                           </a:rPr>
                         </m:ctrlPr>
                       </m:fPr>
@@ -10056,7 +10093,7 @@
                           <m:sSupPr>
                             <m:ctrlPr>
                               <a:rPr lang="en-US" sz="3200" b="1" i="1" dirty="0">
-                                <a:latin typeface="Cambria Math" panose="02040503050406030204" pitchFamily="18" charset="0"/>
+                                <a:latin typeface="Cambria Math"/>
                               </a:rPr>
                             </m:ctrlPr>
                           </m:sSupPr>
@@ -10105,7 +10142,7 @@
                       <m:fPr>
                         <m:ctrlPr>
                           <a:rPr lang="en-US" sz="3200" b="1" i="1" dirty="0">
-                            <a:latin typeface="Cambria Math" panose="02040503050406030204" pitchFamily="18" charset="0"/>
+                            <a:latin typeface="Cambria Math"/>
                           </a:rPr>
                         </m:ctrlPr>
                       </m:fPr>
@@ -10140,7 +10177,7 @@
                           <m:sSupPr>
                             <m:ctrlPr>
                               <a:rPr lang="en-US" sz="3200" b="1" i="1" dirty="0">
-                                <a:latin typeface="Cambria Math" panose="02040503050406030204" pitchFamily="18" charset="0"/>
+                                <a:latin typeface="Cambria Math"/>
                               </a:rPr>
                             </m:ctrlPr>
                           </m:sSupPr>
@@ -10260,7 +10297,7 @@
                       <m:dPr>
                         <m:ctrlPr>
                           <a:rPr lang="en-US" sz="3200" b="1" i="1" smtClean="0">
-                            <a:latin typeface="Cambria Math" panose="02040503050406030204" pitchFamily="18" charset="0"/>
+                            <a:latin typeface="Cambria Math"/>
                           </a:rPr>
                         </m:ctrlPr>
                       </m:dPr>
@@ -10295,7 +10332,7 @@
                             <a:solidFill>
                               <a:schemeClr val="tx1"/>
                             </a:solidFill>
-                            <a:latin typeface="Cambria Math" panose="02040503050406030204" pitchFamily="18" charset="0"/>
+                            <a:latin typeface="Cambria Math"/>
                           </a:rPr>
                         </m:ctrlPr>
                       </m:fPr>
@@ -10315,7 +10352,7 @@
                           <m:sSupPr>
                             <m:ctrlPr>
                               <a:rPr lang="en-US" sz="3200" b="1" i="1" dirty="0">
-                                <a:latin typeface="Cambria Math" panose="02040503050406030204" pitchFamily="18" charset="0"/>
+                                <a:latin typeface="Cambria Math"/>
                               </a:rPr>
                             </m:ctrlPr>
                           </m:sSupPr>
@@ -10346,7 +10383,7 @@
                           <m:sSupPr>
                             <m:ctrlPr>
                               <a:rPr lang="en-US" sz="3200" b="1" i="1" dirty="0">
-                                <a:latin typeface="Cambria Math" panose="02040503050406030204" pitchFamily="18" charset="0"/>
+                                <a:latin typeface="Cambria Math"/>
                               </a:rPr>
                             </m:ctrlPr>
                           </m:sSupPr>
@@ -10383,7 +10420,7 @@
                       <m:sSupPr>
                         <m:ctrlPr>
                           <a:rPr lang="en-US" sz="3200" b="1" i="1" dirty="0" smtClean="0">
-                            <a:latin typeface="Cambria Math" panose="02040503050406030204" pitchFamily="18" charset="0"/>
+                            <a:latin typeface="Cambria Math"/>
                           </a:rPr>
                         </m:ctrlPr>
                       </m:sSupPr>
@@ -10424,7 +10461,7 @@
                       <m:fPr>
                         <m:ctrlPr>
                           <a:rPr lang="en-US" sz="3200" b="1" i="1" dirty="0">
-                            <a:latin typeface="Cambria Math" panose="02040503050406030204" pitchFamily="18" charset="0"/>
+                            <a:latin typeface="Cambria Math"/>
                           </a:rPr>
                         </m:ctrlPr>
                       </m:fPr>
@@ -10447,7 +10484,7 @@
                           <m:sSupPr>
                             <m:ctrlPr>
                               <a:rPr lang="en-US" sz="3200" b="1" i="1" dirty="0">
-                                <a:latin typeface="Cambria Math" panose="02040503050406030204" pitchFamily="18" charset="0"/>
+                                <a:latin typeface="Cambria Math"/>
                               </a:rPr>
                             </m:ctrlPr>
                           </m:sSupPr>
@@ -10486,7 +10523,7 @@
                       <m:sSupPr>
                         <m:ctrlPr>
                           <a:rPr lang="en-US" sz="3200" b="1" i="1" dirty="0">
-                            <a:latin typeface="Cambria Math" panose="02040503050406030204" pitchFamily="18" charset="0"/>
+                            <a:latin typeface="Cambria Math"/>
                           </a:rPr>
                         </m:ctrlPr>
                       </m:sSupPr>
@@ -10674,7 +10711,7 @@
     </p:tnLst>
     <p:bldLst>
       <p:bldP spid="9" grpId="0"/>
-      <p:bldP spid="11" grpId="0" animBg="1"/>
+      <p:bldP spid="11" grpId="0"/>
     </p:bldLst>
   </p:timing>
 </p:sld>
@@ -10828,7 +10865,7 @@
           <p:cNvPr id="4" name="TextBox 3">
             <a:extLst>
               <a:ext uri="{FF2B5EF4-FFF2-40B4-BE49-F238E27FC236}">
-                <a16:creationId xmlns:a16="http://schemas.microsoft.com/office/drawing/2014/main" id="{2AD08732-DA46-CBF2-8C19-852153DE9EAB}"/>
+                <a16:creationId xmlns:a16="http://schemas.microsoft.com/office/drawing/2014/main" xmlns="" id="{2AD08732-DA46-CBF2-8C19-852153DE9EAB}"/>
               </a:ext>
             </a:extLst>
           </p:cNvPr>
@@ -11273,7 +11310,7 @@
           <p:cNvPr id="5" name="TextBox 4">
             <a:extLst>
               <a:ext uri="{FF2B5EF4-FFF2-40B4-BE49-F238E27FC236}">
-                <a16:creationId xmlns:a16="http://schemas.microsoft.com/office/drawing/2014/main" id="{57834CAD-9EBE-5BC1-BA52-6E49D41FD9CF}"/>
+                <a16:creationId xmlns:a16="http://schemas.microsoft.com/office/drawing/2014/main" xmlns="" id="{57834CAD-9EBE-5BC1-BA52-6E49D41FD9CF}"/>
               </a:ext>
             </a:extLst>
           </p:cNvPr>
@@ -11302,7 +11339,7 @@
             <a:r>
               <a:rPr lang="en-GB" sz="4000" b="1" dirty="0">
                 <a:solidFill>
-                  <a:srgbClr val="0000CC"/>
+                  <a:srgbClr val="00B050"/>
                 </a:solidFill>
                 <a:latin typeface="Cambria" panose="02040503050406030204" pitchFamily="18" charset="0"/>
               </a:rPr>
@@ -11310,7 +11347,7 @@
             </a:r>
             <a:endParaRPr lang="en-US" sz="4000" b="1" dirty="0">
               <a:solidFill>
-                <a:srgbClr val="0000CC"/>
+                <a:srgbClr val="00B050"/>
               </a:solidFill>
               <a:latin typeface="Cambria" panose="02040503050406030204" pitchFamily="18" charset="0"/>
             </a:endParaRPr>
@@ -11420,7 +11457,7 @@
           <p:cNvPr id="6" name="TextBox 5">
             <a:extLst>
               <a:ext uri="{FF2B5EF4-FFF2-40B4-BE49-F238E27FC236}">
-                <a16:creationId xmlns:a16="http://schemas.microsoft.com/office/drawing/2014/main" id="{DACF737B-4B69-7767-BD70-CE2FA1FB7326}"/>
+                <a16:creationId xmlns:a16="http://schemas.microsoft.com/office/drawing/2014/main" xmlns="" id="{DACF737B-4B69-7767-BD70-CE2FA1FB7326}"/>
               </a:ext>
             </a:extLst>
           </p:cNvPr>
@@ -11717,7 +11754,7 @@
           <p:cNvPr id="8" name="TextBox 7">
             <a:extLst>
               <a:ext uri="{FF2B5EF4-FFF2-40B4-BE49-F238E27FC236}">
-                <a16:creationId xmlns:a16="http://schemas.microsoft.com/office/drawing/2014/main" id="{1E26CE1C-C844-CC4C-2C89-9648BD73E38B}"/>
+                <a16:creationId xmlns:a16="http://schemas.microsoft.com/office/drawing/2014/main" xmlns="" id="{1E26CE1C-C844-CC4C-2C89-9648BD73E38B}"/>
               </a:ext>
             </a:extLst>
           </p:cNvPr>
@@ -11746,7 +11783,7 @@
             <a:r>
               <a:rPr lang="en-GB" sz="4000" b="1" dirty="0">
                 <a:solidFill>
-                  <a:srgbClr val="0000CC"/>
+                  <a:srgbClr val="00B050"/>
                 </a:solidFill>
                 <a:latin typeface="Cambria" panose="02040503050406030204" pitchFamily="18" charset="0"/>
               </a:rPr>
@@ -11754,7 +11791,7 @@
             </a:r>
             <a:endParaRPr lang="en-US" sz="4000" b="1" dirty="0">
               <a:solidFill>
-                <a:srgbClr val="0000CC"/>
+                <a:srgbClr val="00B050"/>
               </a:solidFill>
               <a:latin typeface="Cambria" panose="02040503050406030204" pitchFamily="18" charset="0"/>
             </a:endParaRPr>
@@ -11800,7 +11837,7 @@
         <p:spPr>
           <a:xfrm>
             <a:off x="387464" y="558856"/>
-            <a:ext cx="4834261" cy="901465"/>
+            <a:ext cx="4834261" cy="1015663"/>
           </a:xfrm>
           <a:prstGeom prst="rect">
             <a:avLst/>
@@ -11836,7 +11873,7 @@
                   <a:noFill/>
                 </a:ln>
                 <a:solidFill>
-                  <a:srgbClr val="0000FF"/>
+                  <a:srgbClr val="00B050"/>
                 </a:solidFill>
                 <a:effectLst/>
                 <a:uLnTx/>
@@ -12237,7 +12274,7 @@
                   <a:noFill/>
                 </a:ln>
                 <a:solidFill>
-                  <a:srgbClr val="0000FF"/>
+                  <a:srgbClr val="00B050"/>
                 </a:solidFill>
                 <a:effectLst/>
                 <a:uLnTx/>
@@ -12546,7 +12583,7 @@
           <p:cNvPr id="5" name="مربع نص 1">
             <a:extLst>
               <a:ext uri="{FF2B5EF4-FFF2-40B4-BE49-F238E27FC236}">
-                <a16:creationId xmlns:a16="http://schemas.microsoft.com/office/drawing/2014/main" id="{7711DB52-DA0E-C95D-DFAF-CCC7BD2BE49D}"/>
+                <a16:creationId xmlns:a16="http://schemas.microsoft.com/office/drawing/2014/main" xmlns="" id="{7711DB52-DA0E-C95D-DFAF-CCC7BD2BE49D}"/>
               </a:ext>
             </a:extLst>
           </p:cNvPr>
@@ -12556,7 +12593,7 @@
         <p:spPr>
           <a:xfrm>
             <a:off x="950647" y="2711422"/>
-            <a:ext cx="4834261" cy="901465"/>
+            <a:ext cx="4834261" cy="1015663"/>
           </a:xfrm>
           <a:prstGeom prst="rect">
             <a:avLst/>
@@ -12592,7 +12629,7 @@
                   <a:noFill/>
                 </a:ln>
                 <a:solidFill>
-                  <a:srgbClr val="0000FF"/>
+                  <a:srgbClr val="00B050"/>
                 </a:solidFill>
                 <a:effectLst/>
                 <a:uLnTx/>
@@ -12610,7 +12647,7 @@
           <p:cNvPr id="6" name="TextBox 5">
             <a:extLst>
               <a:ext uri="{FF2B5EF4-FFF2-40B4-BE49-F238E27FC236}">
-                <a16:creationId xmlns:a16="http://schemas.microsoft.com/office/drawing/2014/main" id="{34183D16-35EC-852C-6B9E-C6ED3DBFD9D3}"/>
+                <a16:creationId xmlns:a16="http://schemas.microsoft.com/office/drawing/2014/main" xmlns="" id="{34183D16-35EC-852C-6B9E-C6ED3DBFD9D3}"/>
               </a:ext>
             </a:extLst>
           </p:cNvPr>
@@ -12937,7 +12974,7 @@
           <p:cNvPr id="7" name="TextBox 6">
             <a:extLst>
               <a:ext uri="{FF2B5EF4-FFF2-40B4-BE49-F238E27FC236}">
-                <a16:creationId xmlns:a16="http://schemas.microsoft.com/office/drawing/2014/main" id="{B66F6C66-435D-19C9-753E-FB43FE2E13B8}"/>
+                <a16:creationId xmlns:a16="http://schemas.microsoft.com/office/drawing/2014/main" xmlns="" id="{B66F6C66-435D-19C9-753E-FB43FE2E13B8}"/>
               </a:ext>
             </a:extLst>
           </p:cNvPr>
@@ -13019,7 +13056,7 @@
           <p:cNvPr id="9" name="مربع نص 1">
             <a:extLst>
               <a:ext uri="{FF2B5EF4-FFF2-40B4-BE49-F238E27FC236}">
-                <a16:creationId xmlns:a16="http://schemas.microsoft.com/office/drawing/2014/main" id="{C21C7ED3-9CF9-F6A0-18E3-82DF544CCBB4}"/>
+                <a16:creationId xmlns:a16="http://schemas.microsoft.com/office/drawing/2014/main" xmlns="" id="{C21C7ED3-9CF9-F6A0-18E3-82DF544CCBB4}"/>
               </a:ext>
             </a:extLst>
           </p:cNvPr>
@@ -13029,7 +13066,7 @@
         <p:spPr>
           <a:xfrm>
             <a:off x="852676" y="364901"/>
-            <a:ext cx="4834261" cy="901465"/>
+            <a:ext cx="4834261" cy="1015663"/>
           </a:xfrm>
           <a:prstGeom prst="rect">
             <a:avLst/>
@@ -13065,7 +13102,7 @@
                   <a:noFill/>
                 </a:ln>
                 <a:solidFill>
-                  <a:srgbClr val="0000FF"/>
+                  <a:srgbClr val="00B050"/>
                 </a:solidFill>
                 <a:effectLst/>
                 <a:uLnTx/>
@@ -13137,7 +13174,7 @@
             <a:r>
               <a:rPr lang="en-US" sz="4000" b="1" dirty="0">
                 <a:solidFill>
-                  <a:srgbClr val="0000FF"/>
+                  <a:srgbClr val="00B050"/>
                 </a:solidFill>
                 <a:latin typeface="Cambria" panose="02040503050406030204" pitchFamily="18" charset="0"/>
               </a:rPr>
@@ -13216,7 +13253,7 @@
                         <m:dPr>
                           <m:ctrlPr>
                             <a:rPr lang="en-US" sz="3200" b="1" i="1" smtClean="0">
-                              <a:latin typeface="Cambria Math" panose="02040503050406030204" pitchFamily="18" charset="0"/>
+                              <a:latin typeface="Cambria Math"/>
                             </a:rPr>
                           </m:ctrlPr>
                         </m:dPr>
@@ -13247,7 +13284,7 @@
                           <m:endChr m:val="]"/>
                           <m:ctrlPr>
                             <a:rPr lang="en-US" sz="3200" b="1" i="1" smtClean="0">
-                              <a:latin typeface="Cambria Math" panose="02040503050406030204" pitchFamily="18" charset="0"/>
+                              <a:latin typeface="Cambria Math"/>
                             </a:rPr>
                           </m:ctrlPr>
                         </m:dPr>
@@ -13262,7 +13299,7 @@
                             <m:dPr>
                               <m:ctrlPr>
                                 <a:rPr lang="en-US" sz="3200" b="1" i="1" smtClean="0">
-                                  <a:latin typeface="Cambria Math" panose="02040503050406030204" pitchFamily="18" charset="0"/>
+                                  <a:latin typeface="Cambria Math"/>
                                 </a:rPr>
                               </m:ctrlPr>
                             </m:dPr>
@@ -13287,7 +13324,7 @@
                         <m:naryPr>
                           <m:ctrlPr>
                             <a:rPr lang="en-US" sz="3200" b="1" i="1" smtClean="0">
-                              <a:latin typeface="Cambria Math" panose="02040503050406030204" pitchFamily="18" charset="0"/>
+                              <a:latin typeface="Cambria Math"/>
                             </a:rPr>
                           </m:ctrlPr>
                         </m:naryPr>
@@ -13296,7 +13333,7 @@
                             <m:sSupPr>
                               <m:ctrlPr>
                                 <a:rPr lang="en-US" sz="3200" b="1" i="1" smtClean="0">
-                                  <a:latin typeface="Cambria Math" panose="02040503050406030204" pitchFamily="18" charset="0"/>
+                                  <a:latin typeface="Cambria Math"/>
                                 </a:rPr>
                               </m:ctrlPr>
                             </m:sSupPr>
@@ -13356,7 +13393,7 @@
                             <m:sSupPr>
                               <m:ctrlPr>
                                 <a:rPr lang="en-US" sz="3200" b="1" i="1" smtClean="0">
-                                  <a:latin typeface="Cambria Math" panose="02040503050406030204" pitchFamily="18" charset="0"/>
+                                  <a:latin typeface="Cambria Math"/>
                                 </a:rPr>
                               </m:ctrlPr>
                             </m:sSupPr>
@@ -13511,7 +13548,7 @@
                             <a:solidFill>
                               <a:srgbClr val="FF0000"/>
                             </a:solidFill>
-                            <a:latin typeface="Cambria Math" panose="02040503050406030204" pitchFamily="18" charset="0"/>
+                            <a:latin typeface="Cambria Math"/>
                           </a:rPr>
                         </m:ctrlPr>
                       </m:radPr>
@@ -13653,7 +13690,7 @@
                         <m:dPr>
                           <m:ctrlPr>
                             <a:rPr lang="en-US" sz="3200" b="1" i="1">
-                              <a:latin typeface="Cambria Math" panose="02040503050406030204" pitchFamily="18" charset="0"/>
+                              <a:latin typeface="Cambria Math"/>
                             </a:rPr>
                           </m:ctrlPr>
                         </m:dPr>
@@ -13748,7 +13785,7 @@
                         <m:fPr>
                           <m:ctrlPr>
                             <a:rPr lang="en-US" sz="3200" b="1" i="1" dirty="0">
-                              <a:latin typeface="Cambria Math" panose="02040503050406030204" pitchFamily="18" charset="0"/>
+                              <a:latin typeface="Cambria Math"/>
                             </a:rPr>
                           </m:ctrlPr>
                         </m:fPr>
@@ -13850,7 +13887,7 @@
                       <m:dPr>
                         <m:ctrlPr>
                           <a:rPr lang="en-US" sz="3200" b="1" i="1">
-                            <a:latin typeface="Cambria Math" panose="02040503050406030204" pitchFamily="18" charset="0"/>
+                            <a:latin typeface="Cambria Math"/>
                           </a:rPr>
                         </m:ctrlPr>
                       </m:dPr>
@@ -13987,7 +14024,7 @@
                         <m:fPr>
                           <m:ctrlPr>
                             <a:rPr lang="en-US" sz="3200" b="1" i="1" dirty="0">
-                              <a:latin typeface="Cambria Math" panose="02040503050406030204" pitchFamily="18" charset="0"/>
+                              <a:latin typeface="Cambria Math"/>
                             </a:rPr>
                           </m:ctrlPr>
                         </m:fPr>
@@ -14004,7 +14041,7 @@
                             <m:sSupPr>
                               <m:ctrlPr>
                                 <a:rPr lang="en-US" sz="3200" b="1" i="1" dirty="0">
-                                  <a:latin typeface="Cambria Math" panose="02040503050406030204" pitchFamily="18" charset="0"/>
+                                  <a:latin typeface="Cambria Math"/>
                                 </a:rPr>
                               </m:ctrlPr>
                             </m:sSupPr>
@@ -14109,7 +14146,7 @@
                         <m:sSupPr>
                           <m:ctrlPr>
                             <a:rPr lang="en-US" sz="3200" b="1" i="1">
-                              <a:latin typeface="Cambria Math" panose="02040503050406030204" pitchFamily="18" charset="0"/>
+                              <a:latin typeface="Cambria Math"/>
                             </a:rPr>
                           </m:ctrlPr>
                         </m:sSupPr>
@@ -14243,7 +14280,7 @@
                         <m:fPr>
                           <m:ctrlPr>
                             <a:rPr lang="en-US" sz="3200" b="1" i="1" dirty="0">
-                              <a:latin typeface="Cambria Math" panose="02040503050406030204" pitchFamily="18" charset="0"/>
+                              <a:latin typeface="Cambria Math"/>
                             </a:rPr>
                           </m:ctrlPr>
                         </m:fPr>
@@ -14260,7 +14297,7 @@
                             <m:sSupPr>
                               <m:ctrlPr>
                                 <a:rPr lang="en-US" sz="3200" b="1" i="1" dirty="0">
-                                  <a:latin typeface="Cambria Math" panose="02040503050406030204" pitchFamily="18" charset="0"/>
+                                  <a:latin typeface="Cambria Math"/>
                                 </a:rPr>
                               </m:ctrlPr>
                             </m:sSupPr>
@@ -14365,7 +14402,7 @@
                         <m:sSupPr>
                           <m:ctrlPr>
                             <a:rPr lang="en-US" sz="3200" b="1" i="1">
-                              <a:latin typeface="Cambria Math" panose="02040503050406030204" pitchFamily="18" charset="0"/>
+                              <a:latin typeface="Cambria Math"/>
                             </a:rPr>
                           </m:ctrlPr>
                         </m:sSupPr>
@@ -14499,7 +14536,7 @@
                         <m:fPr>
                           <m:ctrlPr>
                             <a:rPr lang="en-US" sz="3200" b="1" i="1" dirty="0">
-                              <a:latin typeface="Cambria Math" panose="02040503050406030204" pitchFamily="18" charset="0"/>
+                              <a:latin typeface="Cambria Math"/>
                             </a:rPr>
                           </m:ctrlPr>
                         </m:fPr>
@@ -14522,7 +14559,7 @@
                             <m:sSupPr>
                               <m:ctrlPr>
                                 <a:rPr lang="en-US" sz="3200" b="1" i="1" dirty="0">
-                                  <a:latin typeface="Cambria Math" panose="02040503050406030204" pitchFamily="18" charset="0"/>
+                                  <a:latin typeface="Cambria Math"/>
                                 </a:rPr>
                               </m:ctrlPr>
                             </m:sSupPr>
@@ -14614,7 +14651,12 @@
             <p:ph type="title"/>
           </p:nvPr>
         </p:nvSpPr>
-        <p:spPr/>
+        <p:spPr>
+          <a:xfrm>
+            <a:off x="707571" y="16782"/>
+            <a:ext cx="10515600" cy="1325563"/>
+          </a:xfrm>
+        </p:spPr>
         <p:txBody>
           <a:bodyPr>
             <a:normAutofit/>
@@ -14624,7 +14666,7 @@
             <a:r>
               <a:rPr lang="en-US" sz="4800" dirty="0">
                 <a:solidFill>
-                  <a:srgbClr val="0000FF"/>
+                  <a:srgbClr val="00B050"/>
                 </a:solidFill>
                 <a:latin typeface="Cambria" panose="02040503050406030204" pitchFamily="18" charset="0"/>
                 <a:ea typeface="Cambria" panose="02040503050406030204" pitchFamily="18" charset="0"/>
@@ -15891,7 +15933,7 @@
                         <m:dPr>
                           <m:ctrlPr>
                             <a:rPr lang="en-US" sz="3200" b="1" i="1">
-                              <a:latin typeface="Cambria Math" panose="02040503050406030204" pitchFamily="18" charset="0"/>
+                              <a:latin typeface="Cambria Math"/>
                             </a:rPr>
                           </m:ctrlPr>
                         </m:dPr>
@@ -15998,7 +16040,7 @@
                         <m:fPr>
                           <m:ctrlPr>
                             <a:rPr lang="en-US" sz="3200" b="1" i="1" dirty="0">
-                              <a:latin typeface="Cambria Math" panose="02040503050406030204" pitchFamily="18" charset="0"/>
+                              <a:latin typeface="Cambria Math"/>
                             </a:rPr>
                           </m:ctrlPr>
                         </m:fPr>
@@ -16007,7 +16049,7 @@
                             <m:sSupPr>
                               <m:ctrlPr>
                                 <a:rPr lang="en-US" sz="3200" b="1" i="1" dirty="0">
-                                  <a:latin typeface="Cambria Math" panose="02040503050406030204" pitchFamily="18" charset="0"/>
+                                  <a:latin typeface="Cambria Math"/>
                                 </a:rPr>
                               </m:ctrlPr>
                             </m:sSupPr>
@@ -16126,7 +16168,7 @@
                         <m:fPr>
                           <m:ctrlPr>
                             <a:rPr lang="en-US" sz="3200" b="1" i="1" dirty="0">
-                              <a:latin typeface="Cambria Math" panose="02040503050406030204" pitchFamily="18" charset="0"/>
+                              <a:latin typeface="Cambria Math"/>
                             </a:rPr>
                           </m:ctrlPr>
                         </m:fPr>
@@ -16143,7 +16185,7 @@
                             <m:sSupPr>
                               <m:ctrlPr>
                                 <a:rPr lang="en-US" sz="3200" b="1" i="1" dirty="0">
-                                  <a:latin typeface="Cambria Math" panose="02040503050406030204" pitchFamily="18" charset="0"/>
+                                  <a:latin typeface="Cambria Math"/>
                                 </a:rPr>
                               </m:ctrlPr>
                             </m:sSupPr>
@@ -16257,7 +16299,7 @@
             <a:r>
               <a:rPr lang="en-US" sz="4800" dirty="0">
                 <a:solidFill>
-                  <a:srgbClr val="0000FF"/>
+                  <a:srgbClr val="00B050"/>
                 </a:solidFill>
                 <a:latin typeface="Cambria" panose="02040503050406030204" pitchFamily="18" charset="0"/>
                 <a:ea typeface="Cambria" panose="02040503050406030204" pitchFamily="18" charset="0"/>
@@ -16464,7 +16506,7 @@
                         <m:dPr>
                           <m:ctrlPr>
                             <a:rPr lang="en-US" sz="3200" b="1" i="1">
-                              <a:latin typeface="Cambria Math" panose="02040503050406030204" pitchFamily="18" charset="0"/>
+                              <a:latin typeface="Cambria Math"/>
                             </a:rPr>
                           </m:ctrlPr>
                         </m:dPr>
@@ -16571,7 +16613,7 @@
                         <m:fPr>
                           <m:ctrlPr>
                             <a:rPr lang="en-US" sz="3200" b="1" i="1" dirty="0">
-                              <a:latin typeface="Cambria Math" panose="02040503050406030204" pitchFamily="18" charset="0"/>
+                              <a:latin typeface="Cambria Math"/>
                             </a:rPr>
                           </m:ctrlPr>
                         </m:fPr>
@@ -16580,7 +16622,7 @@
                             <m:sSupPr>
                               <m:ctrlPr>
                                 <a:rPr lang="en-US" sz="3200" b="1" i="1" dirty="0">
-                                  <a:latin typeface="Cambria Math" panose="02040503050406030204" pitchFamily="18" charset="0"/>
+                                  <a:latin typeface="Cambria Math"/>
                                 </a:rPr>
                               </m:ctrlPr>
                             </m:sSupPr>
@@ -16705,7 +16747,7 @@
                         <m:sSupPr>
                           <m:ctrlPr>
                             <a:rPr lang="en-US" sz="3200" b="1" i="1">
-                              <a:latin typeface="Cambria Math" panose="02040503050406030204" pitchFamily="18" charset="0"/>
+                              <a:latin typeface="Cambria Math"/>
                             </a:rPr>
                           </m:ctrlPr>
                         </m:sSupPr>
@@ -16845,7 +16887,7 @@
                         <m:sSupPr>
                           <m:ctrlPr>
                             <a:rPr lang="en-US" sz="3200" b="1" i="1">
-                              <a:latin typeface="Cambria Math" panose="02040503050406030204" pitchFamily="18" charset="0"/>
+                              <a:latin typeface="Cambria Math"/>
                             </a:rPr>
                           </m:ctrlPr>
                         </m:sSupPr>
@@ -16985,7 +17027,7 @@
                         <m:fPr>
                           <m:ctrlPr>
                             <a:rPr lang="en-US" sz="3200" b="1" i="1" dirty="0">
-                              <a:latin typeface="Cambria Math" panose="02040503050406030204" pitchFamily="18" charset="0"/>
+                              <a:latin typeface="Cambria Math"/>
                             </a:rPr>
                           </m:ctrlPr>
                         </m:fPr>
@@ -18145,7 +18187,7 @@
             <a:r>
               <a:rPr lang="en-US" sz="4000" b="1" dirty="0">
                 <a:solidFill>
-                  <a:srgbClr val="0000FF"/>
+                  <a:srgbClr val="00B050"/>
                 </a:solidFill>
                 <a:latin typeface="Cambria" panose="02040503050406030204" pitchFamily="18" charset="0"/>
                 <a:ea typeface="Cambria" panose="02040503050406030204" pitchFamily="18" charset="0"/>
@@ -18196,7 +18238,7 @@
                         <m:dPr>
                           <m:ctrlPr>
                             <a:rPr lang="en-US" sz="3200" i="1" smtClean="0">
-                              <a:latin typeface="Cambria Math" panose="02040503050406030204" pitchFamily="18" charset="0"/>
+                              <a:latin typeface="Cambria Math"/>
                             </a:rPr>
                           </m:ctrlPr>
                         </m:dPr>
@@ -18291,7 +18333,7 @@
                         <m:fPr>
                           <m:ctrlPr>
                             <a:rPr lang="en-US" sz="3200" i="1" dirty="0" smtClean="0">
-                              <a:latin typeface="Cambria Math" panose="02040503050406030204" pitchFamily="18" charset="0"/>
+                              <a:latin typeface="Cambria Math"/>
                             </a:rPr>
                           </m:ctrlPr>
                         </m:fPr>
@@ -18452,7 +18494,7 @@
                         <m:dPr>
                           <m:ctrlPr>
                             <a:rPr lang="en-US" sz="3200" i="1" smtClean="0">
-                              <a:latin typeface="Cambria Math" panose="02040503050406030204" pitchFamily="18" charset="0"/>
+                              <a:latin typeface="Cambria Math"/>
                             </a:rPr>
                           </m:ctrlPr>
                         </m:dPr>
@@ -18559,7 +18601,7 @@
                         <m:fPr>
                           <m:ctrlPr>
                             <a:rPr lang="en-US" sz="3200" i="1" dirty="0" smtClean="0">
-                              <a:latin typeface="Cambria Math" panose="02040503050406030204" pitchFamily="18" charset="0"/>
+                              <a:latin typeface="Cambria Math"/>
                             </a:rPr>
                           </m:ctrlPr>
                         </m:fPr>
@@ -18568,7 +18610,7 @@
                             <m:sSupPr>
                               <m:ctrlPr>
                                 <a:rPr lang="en-US" sz="3200" i="1" dirty="0" smtClean="0">
-                                  <a:latin typeface="Cambria Math" panose="02040503050406030204" pitchFamily="18" charset="0"/>
+                                  <a:latin typeface="Cambria Math"/>
                                 </a:rPr>
                               </m:ctrlPr>
                             </m:sSupPr>
@@ -18794,7 +18836,7 @@
                         <m:sSupPr>
                           <m:ctrlPr>
                             <a:rPr lang="en-US" sz="3200" i="1" smtClean="0">
-                              <a:latin typeface="Cambria Math" panose="02040503050406030204" pitchFamily="18" charset="0"/>
+                              <a:latin typeface="Cambria Math"/>
                             </a:rPr>
                           </m:ctrlPr>
                         </m:sSupPr>
@@ -19070,7 +19112,7 @@
           <p:cNvPr id="9" name="Title 1">
             <a:extLst>
               <a:ext uri="{FF2B5EF4-FFF2-40B4-BE49-F238E27FC236}">
-                <a16:creationId xmlns:a16="http://schemas.microsoft.com/office/drawing/2014/main" id="{42521907-02B5-F677-490F-83DE0A40DEA9}"/>
+                <a16:creationId xmlns:a16="http://schemas.microsoft.com/office/drawing/2014/main" xmlns="" id="{42521907-02B5-F677-490F-83DE0A40DEA9}"/>
               </a:ext>
             </a:extLst>
           </p:cNvPr>
@@ -19745,7 +19787,7 @@
                             <a:solidFill>
                               <a:schemeClr val="tx1"/>
                             </a:solidFill>
-                            <a:latin typeface="Cambria Math" panose="02040503050406030204" pitchFamily="18" charset="0"/>
+                            <a:latin typeface="Cambria Math"/>
                             <a:ea typeface="Cambria Math" panose="02040503050406030204" pitchFamily="18" charset="0"/>
                           </a:rPr>
                         </m:ctrlPr>
@@ -19780,7 +19822,7 @@
                             <a:solidFill>
                               <a:schemeClr val="tx1"/>
                             </a:solidFill>
-                            <a:latin typeface="Cambria Math" panose="02040503050406030204" pitchFamily="18" charset="0"/>
+                            <a:latin typeface="Cambria Math"/>
                             <a:ea typeface="Cambria Math" panose="02040503050406030204" pitchFamily="18" charset="0"/>
                           </a:rPr>
                         </m:ctrlPr>
@@ -19808,7 +19850,7 @@
                                 <a:solidFill>
                                   <a:schemeClr val="tx1"/>
                                 </a:solidFill>
-                                <a:latin typeface="Cambria Math" panose="02040503050406030204" pitchFamily="18" charset="0"/>
+                                <a:latin typeface="Cambria Math"/>
                                 <a:ea typeface="Cambria Math" panose="02040503050406030204" pitchFamily="18" charset="0"/>
                               </a:rPr>
                             </m:ctrlPr>
@@ -19855,7 +19897,7 @@
                                 <a:solidFill>
                                   <a:schemeClr val="tx1"/>
                                 </a:solidFill>
-                                <a:latin typeface="Cambria Math" panose="02040503050406030204" pitchFamily="18" charset="0"/>
+                                <a:latin typeface="Cambria Math"/>
                                 <a:ea typeface="Cambria Math" panose="02040503050406030204" pitchFamily="18" charset="0"/>
                               </a:rPr>
                             </m:ctrlPr>
@@ -19892,7 +19934,7 @@
                                 <a:solidFill>
                                   <a:schemeClr val="tx1"/>
                                 </a:solidFill>
-                                <a:latin typeface="Cambria Math" panose="02040503050406030204" pitchFamily="18" charset="0"/>
+                                <a:latin typeface="Cambria Math"/>
                                 <a:ea typeface="Cambria Math" panose="02040503050406030204" pitchFamily="18" charset="0"/>
                               </a:rPr>
                             </m:ctrlPr>
@@ -19902,7 +19944,7 @@
                               <m:fPr>
                                 <m:ctrlPr>
                                   <a:rPr lang="en-US" sz="3000" i="1">
-                                    <a:latin typeface="Cambria Math" panose="02040503050406030204" pitchFamily="18" charset="0"/>
+                                    <a:latin typeface="Cambria Math"/>
                                     <a:ea typeface="Cambria Math" panose="02040503050406030204" pitchFamily="18" charset="0"/>
                                   </a:rPr>
                                 </m:ctrlPr>
@@ -19912,7 +19954,7 @@
                                   <m:sSupPr>
                                     <m:ctrlPr>
                                       <a:rPr lang="en-US" sz="3000" i="1">
-                                        <a:latin typeface="Cambria Math" panose="02040503050406030204" pitchFamily="18" charset="0"/>
+                                        <a:latin typeface="Cambria Math"/>
                                         <a:ea typeface="Cambria Math" panose="02040503050406030204" pitchFamily="18" charset="0"/>
                                       </a:rPr>
                                     </m:ctrlPr>
@@ -19982,7 +20024,7 @@
                               <m:fPr>
                                 <m:ctrlPr>
                                   <a:rPr lang="en-US" sz="3000" i="1">
-                                    <a:latin typeface="Cambria Math" panose="02040503050406030204" pitchFamily="18" charset="0"/>
+                                    <a:latin typeface="Cambria Math"/>
                                     <a:ea typeface="Cambria Math" panose="02040503050406030204" pitchFamily="18" charset="0"/>
                                   </a:rPr>
                                 </m:ctrlPr>
@@ -19992,7 +20034,7 @@
                                   <m:sSupPr>
                                     <m:ctrlPr>
                                       <a:rPr lang="en-US" sz="3000" i="1">
-                                        <a:latin typeface="Cambria Math" panose="02040503050406030204" pitchFamily="18" charset="0"/>
+                                        <a:latin typeface="Cambria Math"/>
                                         <a:ea typeface="Cambria Math" panose="02040503050406030204" pitchFamily="18" charset="0"/>
                                       </a:rPr>
                                     </m:ctrlPr>
@@ -20071,7 +20113,7 @@
                           <m:dPr>
                             <m:ctrlPr>
                               <a:rPr lang="en-US" sz="3000" i="1">
-                                <a:latin typeface="Cambria Math" panose="02040503050406030204" pitchFamily="18" charset="0"/>
+                                <a:latin typeface="Cambria Math"/>
                                 <a:ea typeface="Cambria Math" panose="02040503050406030204" pitchFamily="18" charset="0"/>
                               </a:rPr>
                             </m:ctrlPr>
@@ -20217,7 +20259,7 @@
                             <a:solidFill>
                               <a:srgbClr val="0000FF"/>
                             </a:solidFill>
-                            <a:latin typeface="Cambria Math" panose="02040503050406030204" pitchFamily="18" charset="0"/>
+                            <a:latin typeface="Cambria Math"/>
                           </a:rPr>
                         </m:ctrlPr>
                       </m:fPr>
@@ -20373,7 +20415,7 @@
                             <a:solidFill>
                               <a:schemeClr val="tx1"/>
                             </a:solidFill>
-                            <a:latin typeface="Cambria Math" panose="02040503050406030204" pitchFamily="18" charset="0"/>
+                            <a:latin typeface="Cambria Math"/>
                             <a:ea typeface="Cambria Math" panose="02040503050406030204" pitchFamily="18" charset="0"/>
                           </a:rPr>
                         </m:ctrlPr>
@@ -20438,7 +20480,7 @@
                                 <a:solidFill>
                                   <a:schemeClr val="tx1"/>
                                 </a:solidFill>
-                                <a:latin typeface="Cambria Math" panose="02040503050406030204" pitchFamily="18" charset="0"/>
+                                <a:latin typeface="Cambria Math"/>
                                 <a:ea typeface="Cambria Math" panose="02040503050406030204" pitchFamily="18" charset="0"/>
                               </a:rPr>
                             </m:ctrlPr>
@@ -20495,7 +20537,7 @@
                                 <a:solidFill>
                                   <a:schemeClr val="tx1"/>
                                 </a:solidFill>
-                                <a:latin typeface="Cambria Math" panose="02040503050406030204" pitchFamily="18" charset="0"/>
+                                <a:latin typeface="Cambria Math"/>
                                 <a:ea typeface="Cambria Math" panose="02040503050406030204" pitchFamily="18" charset="0"/>
                               </a:rPr>
                             </m:ctrlPr>
@@ -20575,7 +20617,7 @@
                                 <a:solidFill>
                                   <a:schemeClr val="tx1"/>
                                 </a:solidFill>
-                                <a:latin typeface="Cambria Math" panose="02040503050406030204" pitchFamily="18" charset="0"/>
+                                <a:latin typeface="Cambria Math"/>
                                 <a:ea typeface="Cambria Math" panose="02040503050406030204" pitchFamily="18" charset="0"/>
                               </a:rPr>
                             </m:ctrlPr>
@@ -20671,7 +20713,7 @@
                             <a:solidFill>
                               <a:schemeClr val="tx1"/>
                             </a:solidFill>
-                            <a:latin typeface="Cambria Math" panose="02040503050406030204" pitchFamily="18" charset="0"/>
+                            <a:latin typeface="Cambria Math"/>
                             <a:ea typeface="Cambria Math" panose="02040503050406030204" pitchFamily="18" charset="0"/>
                           </a:rPr>
                         </m:ctrlPr>
@@ -20720,7 +20762,7 @@
                             <a:solidFill>
                               <a:schemeClr val="tx1"/>
                             </a:solidFill>
-                            <a:latin typeface="Cambria Math" panose="02040503050406030204" pitchFamily="18" charset="0"/>
+                            <a:latin typeface="Cambria Math"/>
                             <a:ea typeface="Cambria Math" panose="02040503050406030204" pitchFamily="18" charset="0"/>
                           </a:rPr>
                         </m:ctrlPr>
@@ -20733,7 +20775,7 @@
                                 <a:solidFill>
                                   <a:schemeClr val="tx1"/>
                                 </a:solidFill>
-                                <a:latin typeface="Cambria Math" panose="02040503050406030204" pitchFamily="18" charset="0"/>
+                                <a:latin typeface="Cambria Math"/>
                                 <a:ea typeface="Cambria Math" panose="02040503050406030204" pitchFamily="18" charset="0"/>
                               </a:rPr>
                             </m:ctrlPr>
@@ -20844,7 +20886,7 @@
                                     <a:solidFill>
                                       <a:schemeClr val="tx1"/>
                                     </a:solidFill>
-                                    <a:latin typeface="Cambria Math" panose="02040503050406030204" pitchFamily="18" charset="0"/>
+                                    <a:latin typeface="Cambria Math"/>
                                     <a:ea typeface="Cambria Math" panose="02040503050406030204" pitchFamily="18" charset="0"/>
                                   </a:rPr>
                                 </m:ctrlPr>
@@ -20891,7 +20933,7 @@
                                     <a:solidFill>
                                       <a:schemeClr val="tx1"/>
                                     </a:solidFill>
-                                    <a:latin typeface="Cambria Math" panose="02040503050406030204" pitchFamily="18" charset="0"/>
+                                    <a:latin typeface="Cambria Math"/>
                                     <a:ea typeface="Cambria Math" panose="02040503050406030204" pitchFamily="18" charset="0"/>
                                   </a:rPr>
                                 </m:ctrlPr>
@@ -20945,7 +20987,7 @@
                             <a:solidFill>
                               <a:schemeClr val="tx1"/>
                             </a:solidFill>
-                            <a:latin typeface="Cambria Math" panose="02040503050406030204" pitchFamily="18" charset="0"/>
+                            <a:latin typeface="Cambria Math"/>
                             <a:ea typeface="Cambria Math" panose="02040503050406030204" pitchFamily="18" charset="0"/>
                           </a:rPr>
                         </m:ctrlPr>
@@ -20973,7 +21015,7 @@
                                 <a:solidFill>
                                   <a:schemeClr val="tx1"/>
                                 </a:solidFill>
-                                <a:latin typeface="Cambria Math" panose="02040503050406030204" pitchFamily="18" charset="0"/>
+                                <a:latin typeface="Cambria Math"/>
                                 <a:ea typeface="Cambria Math" panose="02040503050406030204" pitchFamily="18" charset="0"/>
                               </a:rPr>
                             </m:ctrlPr>
@@ -21020,7 +21062,7 @@
                                 <a:solidFill>
                                   <a:schemeClr val="tx1"/>
                                 </a:solidFill>
-                                <a:latin typeface="Cambria Math" panose="02040503050406030204" pitchFamily="18" charset="0"/>
+                                <a:latin typeface="Cambria Math"/>
                                 <a:ea typeface="Cambria Math" panose="02040503050406030204" pitchFamily="18" charset="0"/>
                               </a:rPr>
                             </m:ctrlPr>
@@ -21132,7 +21174,7 @@
             <a:r>
               <a:rPr lang="en-US" sz="4000" b="1" dirty="0">
                 <a:solidFill>
-                  <a:srgbClr val="0000FF"/>
+                  <a:srgbClr val="00B050"/>
                 </a:solidFill>
                 <a:latin typeface="Cambria" panose="02040503050406030204" pitchFamily="18" charset="0"/>
               </a:rPr>
@@ -21141,7 +21183,7 @@
             <a:r>
               <a:rPr lang="lv-LV" sz="4000" b="1" dirty="0">
                 <a:solidFill>
-                  <a:srgbClr val="0000FF"/>
+                  <a:srgbClr val="00B050"/>
                 </a:solidFill>
                 <a:latin typeface="Cambria" panose="02040503050406030204" pitchFamily="18" charset="0"/>
               </a:rPr>
@@ -21150,7 +21192,7 @@
             <a:r>
               <a:rPr lang="en-US" sz="4000" b="1" dirty="0">
                 <a:solidFill>
-                  <a:srgbClr val="0000FF"/>
+                  <a:srgbClr val="00B050"/>
                 </a:solidFill>
                 <a:latin typeface="Cambria" panose="02040503050406030204" pitchFamily="18" charset="0"/>
               </a:rPr>
@@ -21430,7 +21472,7 @@
   <a:extraClrSchemeLst/>
   <a:extLst>
     <a:ext uri="{05A4C25C-085E-4340-85A3-A5531E510DB2}">
-      <thm15:themeFamily xmlns:thm15="http://schemas.microsoft.com/office/thememl/2012/main" name="Office Theme" id="{62F939B6-93AF-4DB8-9C6B-D6C7DFDC589F}" vid="{4A3C46E8-61CC-4603-A589-7422A47A8E4A}"/>
+      <thm15:themeFamily xmlns:thm15="http://schemas.microsoft.com/office/thememl/2012/main" xmlns="" name="Office Theme" id="{62F939B6-93AF-4DB8-9C6B-D6C7DFDC589F}" vid="{4A3C46E8-61CC-4603-A589-7422A47A8E4A}"/>
     </a:ext>
   </a:extLst>
 </a:theme>
@@ -21691,7 +21733,7 @@
   <a:extraClrSchemeLst/>
   <a:extLst>
     <a:ext uri="{05A4C25C-085E-4340-85A3-A5531E510DB2}">
-      <thm15:themeFamily xmlns:thm15="http://schemas.microsoft.com/office/thememl/2012/main" name="Office Theme" id="{62F939B6-93AF-4DB8-9C6B-D6C7DFDC589F}" vid="{4A3C46E8-61CC-4603-A589-7422A47A8E4A}"/>
+      <thm15:themeFamily xmlns:thm15="http://schemas.microsoft.com/office/thememl/2012/main" xmlns="" name="Office Theme" id="{62F939B6-93AF-4DB8-9C6B-D6C7DFDC589F}" vid="{4A3C46E8-61CC-4603-A589-7422A47A8E4A}"/>
     </a:ext>
   </a:extLst>
 </a:theme>

</xml_diff>